<commit_message>
Updated sequence diagram for modify storage path
</commit_message>
<xml_diff>
--- a/docs/diagrams/Diagrams(CS2103T - V0.3).pptx
+++ b/docs/diagrams/Diagrams(CS2103T - V0.3).pptx
@@ -216,7 +216,7 @@
           <a:p>
             <a:fld id="{F5CC4B3F-88C1-4FFA-B1B6-F41C21DC6924}" type="datetimeFigureOut">
               <a:rPr lang="en-US" smtClean="0"/>
-              <a:t>10/30/16</a:t>
+              <a:t>11/6/16</a:t>
             </a:fld>
             <a:endParaRPr lang="en-US"/>
           </a:p>
@@ -665,7 +665,7 @@
           <a:p>
             <a:fld id="{78C97017-6FC3-485B-9764-EAC9E56C1D49}" type="datetimeFigureOut">
               <a:rPr lang="en-US" smtClean="0"/>
-              <a:t>10/30/16</a:t>
+              <a:t>11/6/16</a:t>
             </a:fld>
             <a:endParaRPr lang="en-US"/>
           </a:p>
@@ -835,7 +835,7 @@
           <a:p>
             <a:fld id="{78C97017-6FC3-485B-9764-EAC9E56C1D49}" type="datetimeFigureOut">
               <a:rPr lang="en-US" smtClean="0"/>
-              <a:t>10/30/16</a:t>
+              <a:t>11/6/16</a:t>
             </a:fld>
             <a:endParaRPr lang="en-US"/>
           </a:p>
@@ -1015,7 +1015,7 @@
           <a:p>
             <a:fld id="{78C97017-6FC3-485B-9764-EAC9E56C1D49}" type="datetimeFigureOut">
               <a:rPr lang="en-US" smtClean="0"/>
-              <a:t>10/30/16</a:t>
+              <a:t>11/6/16</a:t>
             </a:fld>
             <a:endParaRPr lang="en-US"/>
           </a:p>
@@ -1185,7 +1185,7 @@
           <a:p>
             <a:fld id="{78C97017-6FC3-485B-9764-EAC9E56C1D49}" type="datetimeFigureOut">
               <a:rPr lang="en-US" smtClean="0"/>
-              <a:t>10/30/16</a:t>
+              <a:t>11/6/16</a:t>
             </a:fld>
             <a:endParaRPr lang="en-US"/>
           </a:p>
@@ -1431,7 +1431,7 @@
           <a:p>
             <a:fld id="{78C97017-6FC3-485B-9764-EAC9E56C1D49}" type="datetimeFigureOut">
               <a:rPr lang="en-US" smtClean="0"/>
-              <a:t>10/30/16</a:t>
+              <a:t>11/6/16</a:t>
             </a:fld>
             <a:endParaRPr lang="en-US"/>
           </a:p>
@@ -1719,7 +1719,7 @@
           <a:p>
             <a:fld id="{78C97017-6FC3-485B-9764-EAC9E56C1D49}" type="datetimeFigureOut">
               <a:rPr lang="en-US" smtClean="0"/>
-              <a:t>10/30/16</a:t>
+              <a:t>11/6/16</a:t>
             </a:fld>
             <a:endParaRPr lang="en-US"/>
           </a:p>
@@ -2141,7 +2141,7 @@
           <a:p>
             <a:fld id="{78C97017-6FC3-485B-9764-EAC9E56C1D49}" type="datetimeFigureOut">
               <a:rPr lang="en-US" smtClean="0"/>
-              <a:t>10/30/16</a:t>
+              <a:t>11/6/16</a:t>
             </a:fld>
             <a:endParaRPr lang="en-US"/>
           </a:p>
@@ -2259,7 +2259,7 @@
           <a:p>
             <a:fld id="{78C97017-6FC3-485B-9764-EAC9E56C1D49}" type="datetimeFigureOut">
               <a:rPr lang="en-US" smtClean="0"/>
-              <a:t>10/30/16</a:t>
+              <a:t>11/6/16</a:t>
             </a:fld>
             <a:endParaRPr lang="en-US"/>
           </a:p>
@@ -2354,7 +2354,7 @@
           <a:p>
             <a:fld id="{78C97017-6FC3-485B-9764-EAC9E56C1D49}" type="datetimeFigureOut">
               <a:rPr lang="en-US" smtClean="0"/>
-              <a:t>10/30/16</a:t>
+              <a:t>11/6/16</a:t>
             </a:fld>
             <a:endParaRPr lang="en-US"/>
           </a:p>
@@ -2631,7 +2631,7 @@
           <a:p>
             <a:fld id="{78C97017-6FC3-485B-9764-EAC9E56C1D49}" type="datetimeFigureOut">
               <a:rPr lang="en-US" smtClean="0"/>
-              <a:t>10/30/16</a:t>
+              <a:t>11/6/16</a:t>
             </a:fld>
             <a:endParaRPr lang="en-US"/>
           </a:p>
@@ -2884,7 +2884,7 @@
           <a:p>
             <a:fld id="{78C97017-6FC3-485B-9764-EAC9E56C1D49}" type="datetimeFigureOut">
               <a:rPr lang="en-US" smtClean="0"/>
-              <a:t>10/30/16</a:t>
+              <a:t>11/6/16</a:t>
             </a:fld>
             <a:endParaRPr lang="en-US"/>
           </a:p>
@@ -3097,7 +3097,7 @@
           <a:p>
             <a:fld id="{78C97017-6FC3-485B-9764-EAC9E56C1D49}" type="datetimeFigureOut">
               <a:rPr lang="en-US" smtClean="0"/>
-              <a:t>10/30/16</a:t>
+              <a:t>11/6/16</a:t>
             </a:fld>
             <a:endParaRPr lang="en-US"/>
           </a:p>
@@ -17777,15 +17777,7 @@
                   <a:srgbClr val="0070C0"/>
                 </a:solidFill>
               </a:rPr>
-              <a:t>execute</a:t>
-            </a:r>
-            <a:r>
-              <a:rPr lang="en-US" sz="1400" dirty="0" smtClean="0">
-                <a:solidFill>
-                  <a:srgbClr val="0070C0"/>
-                </a:solidFill>
-              </a:rPr>
-              <a:t>(“modify storage/</a:t>
+              <a:t>execute(“modify storage/</a:t>
             </a:r>
             <a:r>
               <a:rPr lang="en-US" sz="1400" dirty="0" err="1" smtClean="0">
@@ -17942,11 +17934,7 @@
             <a:pPr algn="l"/>
             <a:r>
               <a:rPr lang="en-US" dirty="0" smtClean="0"/>
-              <a:t>parse</a:t>
-            </a:r>
-            <a:r>
-              <a:rPr lang="en-US" dirty="0" smtClean="0"/>
-              <a:t>(“</a:t>
+              <a:t>parse(“</a:t>
             </a:r>
             <a:r>
               <a:rPr lang="en-US" dirty="0"/>
@@ -18423,7 +18411,6 @@
               <a:rPr lang="en-US" dirty="0"/>
               <a:t>m</a:t>
             </a:r>
-            <a:endParaRPr lang="en-US" dirty="0"/>
           </a:p>
         </p:txBody>
       </p:sp>
@@ -18735,24 +18722,34 @@
               <a:t>post(</a:t>
             </a:r>
             <a:r>
-              <a:rPr lang="en-US" sz="1400" dirty="0" err="1" smtClean="0">
+              <a:rPr lang="en-US" sz="1400" dirty="0" err="1">
                 <a:solidFill>
                   <a:schemeClr val="accent5">
                     <a:lumMod val="75000"/>
                   </a:schemeClr>
                 </a:solidFill>
               </a:rPr>
-              <a:t>ActivityManagerChangedEvent</a:t>
-            </a:r>
-            <a:r>
-              <a:rPr lang="en-US" sz="1400" dirty="0" smtClean="0">
+              <a:t>M</a:t>
+            </a:r>
+            <a:r>
+              <a:rPr lang="en-US" sz="1400" dirty="0" err="1" smtClean="0">
                 <a:solidFill>
                   <a:schemeClr val="accent5">
                     <a:lumMod val="75000"/>
                   </a:schemeClr>
                 </a:solidFill>
               </a:rPr>
-              <a:t>()</a:t>
+              <a:t>odifyStorageEvent</a:t>
+            </a:r>
+            <a:r>
+              <a:rPr lang="en-US" sz="1400" dirty="0" smtClean="0">
+                <a:solidFill>
+                  <a:schemeClr val="accent5">
+                    <a:lumMod val="75000"/>
+                  </a:schemeClr>
+                </a:solidFill>
+              </a:rPr>
+              <a:t>())</a:t>
             </a:r>
             <a:endParaRPr lang="en-US" sz="1400" dirty="0">
               <a:solidFill>
@@ -18808,8 +18805,8 @@
         </p:nvSpPr>
         <p:spPr>
           <a:xfrm>
-            <a:off x="66246" y="4814292"/>
-            <a:ext cx="929422" cy="430887"/>
+            <a:off x="66245" y="4814292"/>
+            <a:ext cx="993459" cy="861774"/>
           </a:xfrm>
           <a:prstGeom prst="rect">
             <a:avLst/>
@@ -18822,14 +18819,14 @@
           </a:bodyPr>
           <a:lstStyle/>
           <a:p>
-            <a:pPr algn="r"/>
+            <a:pPr algn="ctr"/>
             <a:r>
               <a:rPr lang="en-US" sz="1400" dirty="0" smtClean="0">
                 <a:solidFill>
                   <a:srgbClr val="00B050"/>
                 </a:solidFill>
               </a:rPr>
-              <a:t>Show pop up message</a:t>
+              <a:t>Update status bar to reflect new storage path</a:t>
             </a:r>
             <a:endParaRPr lang="en-US" sz="1400" dirty="0">
               <a:solidFill>

</xml_diff>

<commit_message>
Added sequence diagram for undo command
</commit_message>
<xml_diff>
--- a/docs/diagrams/Diagrams(CS2103T - V0.3).pptx
+++ b/docs/diagrams/Diagrams(CS2103T - V0.3).pptx
@@ -5,7 +5,7 @@
     <p:sldMasterId id="2147483648" r:id="rId1"/>
   </p:sldMasterIdLst>
   <p:notesMasterIdLst>
-    <p:notesMasterId r:id="rId11"/>
+    <p:notesMasterId r:id="rId12"/>
   </p:notesMasterIdLst>
   <p:sldIdLst>
     <p:sldId id="256" r:id="rId2"/>
@@ -17,6 +17,7 @@
     <p:sldId id="263" r:id="rId8"/>
     <p:sldId id="264" r:id="rId9"/>
     <p:sldId id="265" r:id="rId10"/>
+    <p:sldId id="268" r:id="rId11"/>
   </p:sldIdLst>
   <p:sldSz cx="9144000" cy="6858000" type="screen4x3"/>
   <p:notesSz cx="6858000" cy="9144000"/>
@@ -3522,6 +3523,1179 @@
     <p:extLst>
       <p:ext uri="{BB962C8B-B14F-4D97-AF65-F5344CB8AC3E}">
         <p14:creationId xmlns:p14="http://schemas.microsoft.com/office/powerpoint/2010/main" val="2960930635"/>
+      </p:ext>
+    </p:extLst>
+  </p:cSld>
+  <p:clrMapOvr>
+    <a:masterClrMapping/>
+  </p:clrMapOvr>
+</p:sld>
+</file>
+
+<file path=ppt/slides/slide10.xml><?xml version="1.0" encoding="utf-8"?>
+<p:sld xmlns:a="http://schemas.openxmlformats.org/drawingml/2006/main" xmlns:r="http://schemas.openxmlformats.org/officeDocument/2006/relationships" xmlns:p="http://schemas.openxmlformats.org/presentationml/2006/main">
+  <p:cSld>
+    <p:spTree>
+      <p:nvGrpSpPr>
+        <p:cNvPr id="1" name=""/>
+        <p:cNvGrpSpPr/>
+        <p:nvPr/>
+      </p:nvGrpSpPr>
+      <p:grpSpPr>
+        <a:xfrm>
+          <a:off x="0" y="0"/>
+          <a:ext cx="0" cy="0"/>
+          <a:chOff x="0" y="0"/>
+          <a:chExt cx="0" cy="0"/>
+        </a:xfrm>
+      </p:grpSpPr>
+      <p:sp>
+        <p:nvSpPr>
+          <p:cNvPr id="2" name="Rectangle 62"/>
+          <p:cNvSpPr/>
+          <p:nvPr/>
+        </p:nvSpPr>
+        <p:spPr>
+          <a:xfrm>
+            <a:off x="1847025" y="607926"/>
+            <a:ext cx="1093635" cy="346760"/>
+          </a:xfrm>
+          <a:prstGeom prst="rect">
+            <a:avLst/>
+          </a:prstGeom>
+          <a:solidFill>
+            <a:srgbClr val="00B050"/>
+          </a:solidFill>
+          <a:ln w="19050">
+            <a:solidFill>
+              <a:srgbClr val="00B050"/>
+            </a:solidFill>
+          </a:ln>
+          <a:effectLst/>
+        </p:spPr>
+        <p:style>
+          <a:lnRef idx="1">
+            <a:schemeClr val="accent2"/>
+          </a:lnRef>
+          <a:fillRef idx="2">
+            <a:schemeClr val="accent2"/>
+          </a:fillRef>
+          <a:effectRef idx="1">
+            <a:schemeClr val="accent2"/>
+          </a:effectRef>
+          <a:fontRef idx="minor">
+            <a:schemeClr val="dk1"/>
+          </a:fontRef>
+        </p:style>
+        <p:txBody>
+          <a:bodyPr rtlCol="0" anchor="ctr"/>
+          <a:lstStyle/>
+          <a:p>
+            <a:pPr algn="ctr"/>
+            <a:r>
+              <a:rPr lang="en-US" sz="1600" dirty="0" smtClean="0">
+                <a:solidFill>
+                  <a:schemeClr val="bg1"/>
+                </a:solidFill>
+              </a:rPr>
+              <a:t>:UI</a:t>
+            </a:r>
+            <a:endParaRPr lang="en-SG" sz="1600" dirty="0">
+              <a:solidFill>
+                <a:schemeClr val="bg1"/>
+              </a:solidFill>
+            </a:endParaRPr>
+          </a:p>
+        </p:txBody>
+      </p:sp>
+      <p:cxnSp>
+        <p:nvCxnSpPr>
+          <p:cNvPr id="3" name="Straight Connector 2"/>
+          <p:cNvCxnSpPr/>
+          <p:nvPr/>
+        </p:nvCxnSpPr>
+        <p:spPr>
+          <a:xfrm>
+            <a:off x="2393842" y="971597"/>
+            <a:ext cx="0" cy="1723059"/>
+          </a:xfrm>
+          <a:prstGeom prst="line">
+            <a:avLst/>
+          </a:prstGeom>
+          <a:ln w="19050">
+            <a:solidFill>
+              <a:srgbClr val="00B050"/>
+            </a:solidFill>
+            <a:prstDash val="sysDash"/>
+          </a:ln>
+          <a:effectLst/>
+        </p:spPr>
+        <p:style>
+          <a:lnRef idx="1">
+            <a:schemeClr val="accent1"/>
+          </a:lnRef>
+          <a:fillRef idx="2">
+            <a:schemeClr val="accent1"/>
+          </a:fillRef>
+          <a:effectRef idx="1">
+            <a:schemeClr val="accent1"/>
+          </a:effectRef>
+          <a:fontRef idx="minor">
+            <a:schemeClr val="dk1"/>
+          </a:fontRef>
+        </p:style>
+      </p:cxnSp>
+      <p:sp>
+        <p:nvSpPr>
+          <p:cNvPr id="4" name="Rectangle 3"/>
+          <p:cNvSpPr/>
+          <p:nvPr/>
+        </p:nvSpPr>
+        <p:spPr>
+          <a:xfrm>
+            <a:off x="2321834" y="1322292"/>
+            <a:ext cx="152400" cy="1019910"/>
+          </a:xfrm>
+          <a:prstGeom prst="rect">
+            <a:avLst/>
+          </a:prstGeom>
+          <a:solidFill>
+            <a:srgbClr val="00B050"/>
+          </a:solidFill>
+          <a:ln>
+            <a:solidFill>
+              <a:srgbClr val="00B050"/>
+            </a:solidFill>
+          </a:ln>
+          <a:effectLst/>
+        </p:spPr>
+        <p:style>
+          <a:lnRef idx="1">
+            <a:schemeClr val="accent3"/>
+          </a:lnRef>
+          <a:fillRef idx="2">
+            <a:schemeClr val="accent3"/>
+          </a:fillRef>
+          <a:effectRef idx="1">
+            <a:schemeClr val="accent3"/>
+          </a:effectRef>
+          <a:fontRef idx="minor">
+            <a:schemeClr val="dk1"/>
+          </a:fontRef>
+        </p:style>
+        <p:txBody>
+          <a:bodyPr rtlCol="0" anchor="ctr"/>
+          <a:lstStyle/>
+          <a:p>
+            <a:pPr algn="ctr"/>
+            <a:endParaRPr lang="en-SG" sz="1400">
+              <a:solidFill>
+                <a:schemeClr val="dk1"/>
+              </a:solidFill>
+            </a:endParaRPr>
+          </a:p>
+        </p:txBody>
+      </p:sp>
+      <p:grpSp>
+        <p:nvGrpSpPr>
+          <p:cNvPr id="5" name="Actor"/>
+          <p:cNvGrpSpPr/>
+          <p:nvPr/>
+        </p:nvGrpSpPr>
+        <p:grpSpPr>
+          <a:xfrm>
+            <a:off x="887565" y="533400"/>
+            <a:ext cx="324036" cy="573410"/>
+            <a:chOff x="3239901" y="4149080"/>
+            <a:chExt cx="648072" cy="1146820"/>
+          </a:xfrm>
+        </p:grpSpPr>
+        <p:sp>
+          <p:nvSpPr>
+            <p:cNvPr id="6" name="Flowchart: Connector 7"/>
+            <p:cNvSpPr/>
+            <p:nvPr/>
+          </p:nvSpPr>
+          <p:spPr>
+            <a:xfrm>
+              <a:off x="3419872" y="4149080"/>
+              <a:ext cx="288032" cy="288032"/>
+            </a:xfrm>
+            <a:prstGeom prst="flowChartConnector">
+              <a:avLst/>
+            </a:prstGeom>
+            <a:solidFill>
+              <a:schemeClr val="bg1">
+                <a:lumMod val="85000"/>
+              </a:schemeClr>
+            </a:solidFill>
+            <a:ln w="28575">
+              <a:solidFill>
+                <a:schemeClr val="tx1"/>
+              </a:solidFill>
+            </a:ln>
+            <a:effectLst/>
+          </p:spPr>
+          <p:style>
+            <a:lnRef idx="1">
+              <a:schemeClr val="accent4"/>
+            </a:lnRef>
+            <a:fillRef idx="2">
+              <a:schemeClr val="accent4"/>
+            </a:fillRef>
+            <a:effectRef idx="1">
+              <a:schemeClr val="accent4"/>
+            </a:effectRef>
+            <a:fontRef idx="minor">
+              <a:schemeClr val="dk1"/>
+            </a:fontRef>
+          </p:style>
+          <p:txBody>
+            <a:bodyPr rtlCol="0" anchor="ctr"/>
+            <a:lstStyle/>
+            <a:p>
+              <a:pPr algn="ctr"/>
+              <a:endParaRPr lang="en-SG"/>
+            </a:p>
+          </p:txBody>
+        </p:sp>
+        <p:cxnSp>
+          <p:nvCxnSpPr>
+            <p:cNvPr id="7" name="Straight Connector 6"/>
+            <p:cNvCxnSpPr>
+              <a:stCxn id="8" idx="4"/>
+            </p:cNvCxnSpPr>
+            <p:nvPr/>
+          </p:nvCxnSpPr>
+          <p:spPr>
+            <a:xfrm>
+              <a:off x="3563888" y="4437112"/>
+              <a:ext cx="0" cy="504056"/>
+            </a:xfrm>
+            <a:prstGeom prst="line">
+              <a:avLst/>
+            </a:prstGeom>
+            <a:ln w="28575">
+              <a:solidFill>
+                <a:schemeClr val="tx1"/>
+              </a:solidFill>
+            </a:ln>
+            <a:effectLst/>
+          </p:spPr>
+          <p:style>
+            <a:lnRef idx="1">
+              <a:schemeClr val="accent4"/>
+            </a:lnRef>
+            <a:fillRef idx="2">
+              <a:schemeClr val="accent4"/>
+            </a:fillRef>
+            <a:effectRef idx="1">
+              <a:schemeClr val="accent4"/>
+            </a:effectRef>
+            <a:fontRef idx="minor">
+              <a:schemeClr val="dk1"/>
+            </a:fontRef>
+          </p:style>
+        </p:cxnSp>
+        <p:sp>
+          <p:nvSpPr>
+            <p:cNvPr id="8" name="Freeform 7"/>
+            <p:cNvSpPr/>
+            <p:nvPr/>
+          </p:nvSpPr>
+          <p:spPr>
+            <a:xfrm>
+              <a:off x="3324225" y="4933950"/>
+              <a:ext cx="479425" cy="361950"/>
+            </a:xfrm>
+            <a:custGeom>
+              <a:avLst/>
+              <a:gdLst>
+                <a:gd name="connsiteX0" fmla="*/ 0 w 479425"/>
+                <a:gd name="connsiteY0" fmla="*/ 355600 h 361950"/>
+                <a:gd name="connsiteX1" fmla="*/ 241300 w 479425"/>
+                <a:gd name="connsiteY1" fmla="*/ 0 h 361950"/>
+                <a:gd name="connsiteX2" fmla="*/ 479425 w 479425"/>
+                <a:gd name="connsiteY2" fmla="*/ 361950 h 361950"/>
+              </a:gdLst>
+              <a:ahLst/>
+              <a:cxnLst>
+                <a:cxn ang="0">
+                  <a:pos x="connsiteX0" y="connsiteY0"/>
+                </a:cxn>
+                <a:cxn ang="0">
+                  <a:pos x="connsiteX1" y="connsiteY1"/>
+                </a:cxn>
+                <a:cxn ang="0">
+                  <a:pos x="connsiteX2" y="connsiteY2"/>
+                </a:cxn>
+              </a:cxnLst>
+              <a:rect l="l" t="t" r="r" b="b"/>
+              <a:pathLst>
+                <a:path w="479425" h="361950">
+                  <a:moveTo>
+                    <a:pt x="0" y="355600"/>
+                  </a:moveTo>
+                  <a:lnTo>
+                    <a:pt x="241300" y="0"/>
+                  </a:lnTo>
+                  <a:lnTo>
+                    <a:pt x="479425" y="361950"/>
+                  </a:lnTo>
+                </a:path>
+              </a:pathLst>
+            </a:custGeom>
+            <a:noFill/>
+            <a:ln w="28575">
+              <a:solidFill>
+                <a:schemeClr val="tx1"/>
+              </a:solidFill>
+            </a:ln>
+            <a:effectLst/>
+          </p:spPr>
+          <p:style>
+            <a:lnRef idx="1">
+              <a:schemeClr val="accent4"/>
+            </a:lnRef>
+            <a:fillRef idx="2">
+              <a:schemeClr val="accent4"/>
+            </a:fillRef>
+            <a:effectRef idx="1">
+              <a:schemeClr val="accent4"/>
+            </a:effectRef>
+            <a:fontRef idx="minor">
+              <a:schemeClr val="dk1"/>
+            </a:fontRef>
+          </p:style>
+          <p:txBody>
+            <a:bodyPr rtlCol="0" anchor="ctr"/>
+            <a:lstStyle/>
+            <a:p>
+              <a:pPr algn="ctr"/>
+              <a:endParaRPr lang="en-SG"/>
+            </a:p>
+          </p:txBody>
+        </p:sp>
+        <p:cxnSp>
+          <p:nvCxnSpPr>
+            <p:cNvPr id="9" name="Straight Connector 8"/>
+            <p:cNvCxnSpPr/>
+            <p:nvPr/>
+          </p:nvCxnSpPr>
+          <p:spPr>
+            <a:xfrm>
+              <a:off x="3239901" y="4509120"/>
+              <a:ext cx="648072" cy="0"/>
+            </a:xfrm>
+            <a:prstGeom prst="line">
+              <a:avLst/>
+            </a:prstGeom>
+            <a:ln w="28575">
+              <a:solidFill>
+                <a:schemeClr val="tx1"/>
+              </a:solidFill>
+            </a:ln>
+            <a:effectLst/>
+          </p:spPr>
+          <p:style>
+            <a:lnRef idx="1">
+              <a:schemeClr val="accent4"/>
+            </a:lnRef>
+            <a:fillRef idx="2">
+              <a:schemeClr val="accent4"/>
+            </a:fillRef>
+            <a:effectRef idx="1">
+              <a:schemeClr val="accent4"/>
+            </a:effectRef>
+            <a:fontRef idx="minor">
+              <a:schemeClr val="dk1"/>
+            </a:fontRef>
+          </p:style>
+        </p:cxnSp>
+      </p:grpSp>
+      <p:sp>
+        <p:nvSpPr>
+          <p:cNvPr id="10" name="Rectangle 62"/>
+          <p:cNvSpPr/>
+          <p:nvPr/>
+        </p:nvSpPr>
+        <p:spPr>
+          <a:xfrm>
+            <a:off x="3630765" y="611613"/>
+            <a:ext cx="1093635" cy="346760"/>
+          </a:xfrm>
+          <a:prstGeom prst="rect">
+            <a:avLst/>
+          </a:prstGeom>
+          <a:solidFill>
+            <a:srgbClr val="0070C0"/>
+          </a:solidFill>
+          <a:ln w="19050">
+            <a:solidFill>
+              <a:srgbClr val="0070C0"/>
+            </a:solidFill>
+          </a:ln>
+          <a:effectLst/>
+        </p:spPr>
+        <p:style>
+          <a:lnRef idx="1">
+            <a:schemeClr val="accent2"/>
+          </a:lnRef>
+          <a:fillRef idx="2">
+            <a:schemeClr val="accent2"/>
+          </a:fillRef>
+          <a:effectRef idx="1">
+            <a:schemeClr val="accent2"/>
+          </a:effectRef>
+          <a:fontRef idx="minor">
+            <a:schemeClr val="dk1"/>
+          </a:fontRef>
+        </p:style>
+        <p:txBody>
+          <a:bodyPr rtlCol="0" anchor="ctr"/>
+          <a:lstStyle/>
+          <a:p>
+            <a:pPr algn="ctr"/>
+            <a:r>
+              <a:rPr lang="en-US" sz="1600" dirty="0" smtClean="0">
+                <a:solidFill>
+                  <a:schemeClr val="bg1"/>
+                </a:solidFill>
+              </a:rPr>
+              <a:t>:Logic</a:t>
+            </a:r>
+            <a:endParaRPr lang="en-SG" sz="1600" dirty="0">
+              <a:solidFill>
+                <a:schemeClr val="bg1"/>
+              </a:solidFill>
+            </a:endParaRPr>
+          </a:p>
+        </p:txBody>
+      </p:sp>
+      <p:cxnSp>
+        <p:nvCxnSpPr>
+          <p:cNvPr id="11" name="Straight Connector 10"/>
+          <p:cNvCxnSpPr/>
+          <p:nvPr/>
+        </p:nvCxnSpPr>
+        <p:spPr>
+          <a:xfrm>
+            <a:off x="4159973" y="975284"/>
+            <a:ext cx="0" cy="1723059"/>
+          </a:xfrm>
+          <a:prstGeom prst="line">
+            <a:avLst/>
+          </a:prstGeom>
+          <a:ln w="19050">
+            <a:solidFill>
+              <a:srgbClr val="0070C0"/>
+            </a:solidFill>
+            <a:prstDash val="sysDash"/>
+          </a:ln>
+          <a:effectLst/>
+        </p:spPr>
+        <p:style>
+          <a:lnRef idx="1">
+            <a:schemeClr val="accent1"/>
+          </a:lnRef>
+          <a:fillRef idx="2">
+            <a:schemeClr val="accent1"/>
+          </a:fillRef>
+          <a:effectRef idx="1">
+            <a:schemeClr val="accent1"/>
+          </a:effectRef>
+          <a:fontRef idx="minor">
+            <a:schemeClr val="dk1"/>
+          </a:fontRef>
+        </p:style>
+      </p:cxnSp>
+      <p:sp>
+        <p:nvSpPr>
+          <p:cNvPr id="12" name="Rectangle 11"/>
+          <p:cNvSpPr/>
+          <p:nvPr/>
+        </p:nvSpPr>
+        <p:spPr>
+          <a:xfrm>
+            <a:off x="4087965" y="1433477"/>
+            <a:ext cx="144016" cy="832525"/>
+          </a:xfrm>
+          <a:prstGeom prst="rect">
+            <a:avLst/>
+          </a:prstGeom>
+          <a:solidFill>
+            <a:srgbClr val="0070C0"/>
+          </a:solidFill>
+          <a:ln>
+            <a:solidFill>
+              <a:srgbClr val="0070C0"/>
+            </a:solidFill>
+          </a:ln>
+          <a:effectLst/>
+        </p:spPr>
+        <p:style>
+          <a:lnRef idx="1">
+            <a:schemeClr val="accent3"/>
+          </a:lnRef>
+          <a:fillRef idx="2">
+            <a:schemeClr val="accent3"/>
+          </a:fillRef>
+          <a:effectRef idx="1">
+            <a:schemeClr val="accent3"/>
+          </a:effectRef>
+          <a:fontRef idx="minor">
+            <a:schemeClr val="dk1"/>
+          </a:fontRef>
+        </p:style>
+        <p:txBody>
+          <a:bodyPr rtlCol="0" anchor="ctr"/>
+          <a:lstStyle/>
+          <a:p>
+            <a:pPr algn="ctr"/>
+            <a:endParaRPr lang="en-SG" sz="1400">
+              <a:solidFill>
+                <a:schemeClr val="dk1"/>
+              </a:solidFill>
+            </a:endParaRPr>
+          </a:p>
+        </p:txBody>
+      </p:sp>
+      <p:sp>
+        <p:nvSpPr>
+          <p:cNvPr id="13" name="Rectangle 62"/>
+          <p:cNvSpPr/>
+          <p:nvPr/>
+        </p:nvSpPr>
+        <p:spPr>
+          <a:xfrm>
+            <a:off x="6983565" y="607926"/>
+            <a:ext cx="1093635" cy="346760"/>
+          </a:xfrm>
+          <a:prstGeom prst="rect">
+            <a:avLst/>
+          </a:prstGeom>
+          <a:solidFill>
+            <a:srgbClr val="7030A0"/>
+          </a:solidFill>
+          <a:ln w="19050">
+            <a:solidFill>
+              <a:srgbClr val="7030A0"/>
+            </a:solidFill>
+          </a:ln>
+          <a:effectLst/>
+        </p:spPr>
+        <p:style>
+          <a:lnRef idx="1">
+            <a:schemeClr val="accent2"/>
+          </a:lnRef>
+          <a:fillRef idx="2">
+            <a:schemeClr val="accent2"/>
+          </a:fillRef>
+          <a:effectRef idx="1">
+            <a:schemeClr val="accent2"/>
+          </a:effectRef>
+          <a:fontRef idx="minor">
+            <a:schemeClr val="dk1"/>
+          </a:fontRef>
+        </p:style>
+        <p:txBody>
+          <a:bodyPr rtlCol="0" anchor="ctr"/>
+          <a:lstStyle/>
+          <a:p>
+            <a:pPr algn="ctr"/>
+            <a:r>
+              <a:rPr lang="en-US" sz="1600" dirty="0" smtClean="0">
+                <a:solidFill>
+                  <a:schemeClr val="bg1"/>
+                </a:solidFill>
+              </a:rPr>
+              <a:t>:Model</a:t>
+            </a:r>
+            <a:endParaRPr lang="en-SG" sz="1600" dirty="0">
+              <a:solidFill>
+                <a:schemeClr val="bg1"/>
+              </a:solidFill>
+            </a:endParaRPr>
+          </a:p>
+        </p:txBody>
+      </p:sp>
+      <p:cxnSp>
+        <p:nvCxnSpPr>
+          <p:cNvPr id="14" name="Straight Connector 13"/>
+          <p:cNvCxnSpPr/>
+          <p:nvPr/>
+        </p:nvCxnSpPr>
+        <p:spPr>
+          <a:xfrm>
+            <a:off x="7530382" y="971597"/>
+            <a:ext cx="0" cy="1723059"/>
+          </a:xfrm>
+          <a:prstGeom prst="line">
+            <a:avLst/>
+          </a:prstGeom>
+          <a:ln w="19050">
+            <a:solidFill>
+              <a:srgbClr val="7030A0"/>
+            </a:solidFill>
+            <a:prstDash val="sysDash"/>
+          </a:ln>
+          <a:effectLst/>
+        </p:spPr>
+        <p:style>
+          <a:lnRef idx="1">
+            <a:schemeClr val="accent1"/>
+          </a:lnRef>
+          <a:fillRef idx="2">
+            <a:schemeClr val="accent1"/>
+          </a:fillRef>
+          <a:effectRef idx="1">
+            <a:schemeClr val="accent1"/>
+          </a:effectRef>
+          <a:fontRef idx="minor">
+            <a:schemeClr val="dk1"/>
+          </a:fontRef>
+        </p:style>
+      </p:cxnSp>
+      <p:sp>
+        <p:nvSpPr>
+          <p:cNvPr id="15" name="Rectangle 14"/>
+          <p:cNvSpPr/>
+          <p:nvPr/>
+        </p:nvSpPr>
+        <p:spPr>
+          <a:xfrm>
+            <a:off x="7458374" y="1538408"/>
+            <a:ext cx="142006" cy="651394"/>
+          </a:xfrm>
+          <a:prstGeom prst="rect">
+            <a:avLst/>
+          </a:prstGeom>
+          <a:solidFill>
+            <a:srgbClr val="7030A0"/>
+          </a:solidFill>
+          <a:ln>
+            <a:solidFill>
+              <a:srgbClr val="7030A0"/>
+            </a:solidFill>
+          </a:ln>
+          <a:effectLst/>
+        </p:spPr>
+        <p:style>
+          <a:lnRef idx="1">
+            <a:schemeClr val="accent3"/>
+          </a:lnRef>
+          <a:fillRef idx="2">
+            <a:schemeClr val="accent3"/>
+          </a:fillRef>
+          <a:effectRef idx="1">
+            <a:schemeClr val="accent3"/>
+          </a:effectRef>
+          <a:fontRef idx="minor">
+            <a:schemeClr val="dk1"/>
+          </a:fontRef>
+        </p:style>
+        <p:txBody>
+          <a:bodyPr rtlCol="0" anchor="ctr"/>
+          <a:lstStyle/>
+          <a:p>
+            <a:pPr algn="ctr"/>
+            <a:endParaRPr lang="en-SG" sz="1400">
+              <a:solidFill>
+                <a:schemeClr val="dk1"/>
+              </a:solidFill>
+            </a:endParaRPr>
+          </a:p>
+        </p:txBody>
+      </p:sp>
+      <p:cxnSp>
+        <p:nvCxnSpPr>
+          <p:cNvPr id="16" name="Straight Arrow Connector 15"/>
+          <p:cNvCxnSpPr/>
+          <p:nvPr/>
+        </p:nvCxnSpPr>
+        <p:spPr>
+          <a:xfrm>
+            <a:off x="1201983" y="1325979"/>
+            <a:ext cx="1119851" cy="0"/>
+          </a:xfrm>
+          <a:prstGeom prst="straightConnector1">
+            <a:avLst/>
+          </a:prstGeom>
+          <a:ln w="19050">
+            <a:solidFill>
+              <a:schemeClr val="tx1"/>
+            </a:solidFill>
+            <a:tailEnd type="arrow"/>
+          </a:ln>
+        </p:spPr>
+        <p:style>
+          <a:lnRef idx="1">
+            <a:schemeClr val="accent1"/>
+          </a:lnRef>
+          <a:fillRef idx="0">
+            <a:schemeClr val="accent1"/>
+          </a:fillRef>
+          <a:effectRef idx="0">
+            <a:schemeClr val="accent1"/>
+          </a:effectRef>
+          <a:fontRef idx="minor">
+            <a:schemeClr val="tx1"/>
+          </a:fontRef>
+        </p:style>
+      </p:cxnSp>
+      <p:sp>
+        <p:nvSpPr>
+          <p:cNvPr id="17" name="TextBox 16"/>
+          <p:cNvSpPr txBox="1"/>
+          <p:nvPr/>
+        </p:nvSpPr>
+        <p:spPr>
+          <a:xfrm>
+            <a:off x="1201983" y="1345880"/>
+            <a:ext cx="860170" cy="215444"/>
+          </a:xfrm>
+          <a:prstGeom prst="rect">
+            <a:avLst/>
+          </a:prstGeom>
+          <a:noFill/>
+        </p:spPr>
+        <p:txBody>
+          <a:bodyPr wrap="square" lIns="0" tIns="0" rIns="0" bIns="0" rtlCol="0">
+            <a:spAutoFit/>
+          </a:bodyPr>
+          <a:lstStyle/>
+          <a:p>
+            <a:r>
+              <a:rPr lang="en-US" sz="1400" dirty="0" smtClean="0"/>
+              <a:t>undo</a:t>
+            </a:r>
+            <a:endParaRPr lang="en-US" sz="1400" dirty="0"/>
+          </a:p>
+        </p:txBody>
+      </p:sp>
+      <p:cxnSp>
+        <p:nvCxnSpPr>
+          <p:cNvPr id="18" name="Straight Arrow Connector 17"/>
+          <p:cNvCxnSpPr/>
+          <p:nvPr/>
+        </p:nvCxnSpPr>
+        <p:spPr>
+          <a:xfrm flipV="1">
+            <a:off x="2474234" y="1433477"/>
+            <a:ext cx="1461331" cy="1"/>
+          </a:xfrm>
+          <a:prstGeom prst="straightConnector1">
+            <a:avLst/>
+          </a:prstGeom>
+          <a:ln w="19050">
+            <a:solidFill>
+              <a:srgbClr val="00B050"/>
+            </a:solidFill>
+            <a:tailEnd type="arrow"/>
+          </a:ln>
+        </p:spPr>
+        <p:style>
+          <a:lnRef idx="1">
+            <a:schemeClr val="accent1"/>
+          </a:lnRef>
+          <a:fillRef idx="0">
+            <a:schemeClr val="accent1"/>
+          </a:fillRef>
+          <a:effectRef idx="0">
+            <a:schemeClr val="accent1"/>
+          </a:effectRef>
+          <a:fontRef idx="minor">
+            <a:schemeClr val="tx1"/>
+          </a:fontRef>
+        </p:style>
+      </p:cxnSp>
+      <p:sp>
+        <p:nvSpPr>
+          <p:cNvPr id="19" name="TextBox 18"/>
+          <p:cNvSpPr txBox="1"/>
+          <p:nvPr/>
+        </p:nvSpPr>
+        <p:spPr>
+          <a:xfrm>
+            <a:off x="2640165" y="1524000"/>
+            <a:ext cx="1838418" cy="215444"/>
+          </a:xfrm>
+          <a:prstGeom prst="rect">
+            <a:avLst/>
+          </a:prstGeom>
+          <a:noFill/>
+        </p:spPr>
+        <p:txBody>
+          <a:bodyPr wrap="square" lIns="0" tIns="0" rIns="0" bIns="0" rtlCol="0">
+            <a:spAutoFit/>
+          </a:bodyPr>
+          <a:lstStyle/>
+          <a:p>
+            <a:r>
+              <a:rPr lang="en-US" sz="1400" dirty="0" smtClean="0">
+                <a:solidFill>
+                  <a:srgbClr val="0070C0"/>
+                </a:solidFill>
+              </a:rPr>
+              <a:t>execute</a:t>
+            </a:r>
+            <a:r>
+              <a:rPr lang="en-US" sz="1400" dirty="0" smtClean="0">
+                <a:solidFill>
+                  <a:srgbClr val="0070C0"/>
+                </a:solidFill>
+              </a:rPr>
+              <a:t>(“undo”)</a:t>
+            </a:r>
+            <a:endParaRPr lang="en-US" sz="1400" dirty="0">
+              <a:solidFill>
+                <a:srgbClr val="0070C0"/>
+              </a:solidFill>
+            </a:endParaRPr>
+          </a:p>
+        </p:txBody>
+      </p:sp>
+      <p:cxnSp>
+        <p:nvCxnSpPr>
+          <p:cNvPr id="20" name="Straight Arrow Connector 19"/>
+          <p:cNvCxnSpPr/>
+          <p:nvPr/>
+        </p:nvCxnSpPr>
+        <p:spPr>
+          <a:xfrm>
+            <a:off x="4595429" y="1447800"/>
+            <a:ext cx="2619598" cy="2"/>
+          </a:xfrm>
+          <a:prstGeom prst="straightConnector1">
+            <a:avLst/>
+          </a:prstGeom>
+          <a:ln w="19050">
+            <a:solidFill>
+              <a:srgbClr val="0070C0"/>
+            </a:solidFill>
+            <a:tailEnd type="arrow"/>
+          </a:ln>
+        </p:spPr>
+        <p:style>
+          <a:lnRef idx="1">
+            <a:schemeClr val="accent1"/>
+          </a:lnRef>
+          <a:fillRef idx="0">
+            <a:schemeClr val="accent1"/>
+          </a:fillRef>
+          <a:effectRef idx="0">
+            <a:schemeClr val="accent1"/>
+          </a:effectRef>
+          <a:fontRef idx="minor">
+            <a:schemeClr val="tx1"/>
+          </a:fontRef>
+        </p:style>
+      </p:cxnSp>
+      <p:sp>
+        <p:nvSpPr>
+          <p:cNvPr id="21" name="TextBox 20"/>
+          <p:cNvSpPr txBox="1"/>
+          <p:nvPr/>
+        </p:nvSpPr>
+        <p:spPr>
+          <a:xfrm>
+            <a:off x="4642221" y="1828800"/>
+            <a:ext cx="2567765" cy="215444"/>
+          </a:xfrm>
+          <a:prstGeom prst="rect">
+            <a:avLst/>
+          </a:prstGeom>
+          <a:noFill/>
+        </p:spPr>
+        <p:txBody>
+          <a:bodyPr wrap="square" lIns="0" tIns="0" rIns="0" bIns="0" rtlCol="0">
+            <a:spAutoFit/>
+          </a:bodyPr>
+          <a:lstStyle/>
+          <a:p>
+            <a:r>
+              <a:rPr lang="en-US" sz="1400" dirty="0" err="1" smtClean="0">
+                <a:solidFill>
+                  <a:srgbClr val="7030A0"/>
+                </a:solidFill>
+              </a:rPr>
+              <a:t>retreivePreviousStateInUndoStack</a:t>
+            </a:r>
+            <a:endParaRPr lang="en-US" sz="1400" dirty="0">
+              <a:solidFill>
+                <a:srgbClr val="7030A0"/>
+              </a:solidFill>
+            </a:endParaRPr>
+          </a:p>
+        </p:txBody>
+      </p:sp>
+      <p:cxnSp>
+        <p:nvCxnSpPr>
+          <p:cNvPr id="23" name="Straight Arrow Connector 22"/>
+          <p:cNvCxnSpPr/>
+          <p:nvPr/>
+        </p:nvCxnSpPr>
+        <p:spPr>
+          <a:xfrm>
+            <a:off x="4595429" y="1600200"/>
+            <a:ext cx="2619598" cy="1398"/>
+          </a:xfrm>
+          <a:prstGeom prst="straightConnector1">
+            <a:avLst/>
+          </a:prstGeom>
+          <a:ln w="19050">
+            <a:solidFill>
+              <a:srgbClr val="7030A0"/>
+            </a:solidFill>
+            <a:prstDash val="sysDash"/>
+            <a:headEnd type="arrow" w="med" len="med"/>
+            <a:tailEnd type="none" w="med" len="med"/>
+          </a:ln>
+        </p:spPr>
+        <p:style>
+          <a:lnRef idx="1">
+            <a:schemeClr val="accent1"/>
+          </a:lnRef>
+          <a:fillRef idx="0">
+            <a:schemeClr val="accent1"/>
+          </a:fillRef>
+          <a:effectRef idx="0">
+            <a:schemeClr val="accent1"/>
+          </a:effectRef>
+          <a:fontRef idx="minor">
+            <a:schemeClr val="tx1"/>
+          </a:fontRef>
+        </p:style>
+      </p:cxnSp>
+      <p:cxnSp>
+        <p:nvCxnSpPr>
+          <p:cNvPr id="24" name="Straight Arrow Connector 23"/>
+          <p:cNvCxnSpPr/>
+          <p:nvPr/>
+        </p:nvCxnSpPr>
+        <p:spPr>
+          <a:xfrm>
+            <a:off x="2474234" y="2266002"/>
+            <a:ext cx="1461331" cy="0"/>
+          </a:xfrm>
+          <a:prstGeom prst="straightConnector1">
+            <a:avLst/>
+          </a:prstGeom>
+          <a:ln w="19050">
+            <a:solidFill>
+              <a:srgbClr val="0070C0"/>
+            </a:solidFill>
+            <a:prstDash val="sysDash"/>
+            <a:headEnd type="arrow" w="med" len="med"/>
+            <a:tailEnd type="none" w="med" len="med"/>
+          </a:ln>
+        </p:spPr>
+        <p:style>
+          <a:lnRef idx="1">
+            <a:schemeClr val="accent1"/>
+          </a:lnRef>
+          <a:fillRef idx="0">
+            <a:schemeClr val="accent1"/>
+          </a:fillRef>
+          <a:effectRef idx="0">
+            <a:schemeClr val="accent1"/>
+          </a:effectRef>
+          <a:fontRef idx="minor">
+            <a:schemeClr val="tx1"/>
+          </a:fontRef>
+        </p:style>
+      </p:cxnSp>
+      <p:cxnSp>
+        <p:nvCxnSpPr>
+          <p:cNvPr id="25" name="Straight Arrow Connector 24"/>
+          <p:cNvCxnSpPr/>
+          <p:nvPr/>
+        </p:nvCxnSpPr>
+        <p:spPr>
+          <a:xfrm>
+            <a:off x="1125783" y="2342202"/>
+            <a:ext cx="1196051" cy="0"/>
+          </a:xfrm>
+          <a:prstGeom prst="straightConnector1">
+            <a:avLst/>
+          </a:prstGeom>
+          <a:ln w="19050">
+            <a:solidFill>
+              <a:srgbClr val="00B050"/>
+            </a:solidFill>
+            <a:prstDash val="sysDash"/>
+            <a:headEnd type="arrow" w="med" len="med"/>
+            <a:tailEnd type="none" w="med" len="med"/>
+          </a:ln>
+        </p:spPr>
+        <p:style>
+          <a:lnRef idx="1">
+            <a:schemeClr val="accent1"/>
+          </a:lnRef>
+          <a:fillRef idx="0">
+            <a:schemeClr val="accent1"/>
+          </a:fillRef>
+          <a:effectRef idx="0">
+            <a:schemeClr val="accent1"/>
+          </a:effectRef>
+          <a:fontRef idx="minor">
+            <a:schemeClr val="tx1"/>
+          </a:fontRef>
+        </p:style>
+      </p:cxnSp>
+      <p:cxnSp>
+        <p:nvCxnSpPr>
+          <p:cNvPr id="31" name="Straight Connector 30"/>
+          <p:cNvCxnSpPr/>
+          <p:nvPr/>
+        </p:nvCxnSpPr>
+        <p:spPr>
+          <a:xfrm flipH="1">
+            <a:off x="1049559" y="1099672"/>
+            <a:ext cx="24" cy="1598671"/>
+          </a:xfrm>
+          <a:prstGeom prst="line">
+            <a:avLst/>
+          </a:prstGeom>
+          <a:ln w="19050">
+            <a:solidFill>
+              <a:schemeClr val="tx1"/>
+            </a:solidFill>
+            <a:prstDash val="sysDash"/>
+          </a:ln>
+          <a:effectLst/>
+        </p:spPr>
+        <p:style>
+          <a:lnRef idx="1">
+            <a:schemeClr val="accent1"/>
+          </a:lnRef>
+          <a:fillRef idx="2">
+            <a:schemeClr val="accent1"/>
+          </a:fillRef>
+          <a:effectRef idx="1">
+            <a:schemeClr val="accent1"/>
+          </a:effectRef>
+          <a:fontRef idx="minor">
+            <a:schemeClr val="dk1"/>
+          </a:fontRef>
+        </p:style>
+      </p:cxnSp>
+      <p:cxnSp>
+        <p:nvCxnSpPr>
+          <p:cNvPr id="39" name="Straight Arrow Connector 38"/>
+          <p:cNvCxnSpPr/>
+          <p:nvPr/>
+        </p:nvCxnSpPr>
+        <p:spPr>
+          <a:xfrm>
+            <a:off x="4619402" y="2133600"/>
+            <a:ext cx="2619598" cy="2"/>
+          </a:xfrm>
+          <a:prstGeom prst="straightConnector1">
+            <a:avLst/>
+          </a:prstGeom>
+          <a:ln w="19050">
+            <a:solidFill>
+              <a:srgbClr val="0070C0"/>
+            </a:solidFill>
+            <a:tailEnd type="arrow"/>
+          </a:ln>
+        </p:spPr>
+        <p:style>
+          <a:lnRef idx="1">
+            <a:schemeClr val="accent1"/>
+          </a:lnRef>
+          <a:fillRef idx="0">
+            <a:schemeClr val="accent1"/>
+          </a:fillRef>
+          <a:effectRef idx="0">
+            <a:schemeClr val="accent1"/>
+          </a:effectRef>
+          <a:fontRef idx="minor">
+            <a:schemeClr val="tx1"/>
+          </a:fontRef>
+        </p:style>
+      </p:cxnSp>
+      <p:sp>
+        <p:nvSpPr>
+          <p:cNvPr id="40" name="TextBox 39"/>
+          <p:cNvSpPr txBox="1"/>
+          <p:nvPr/>
+        </p:nvSpPr>
+        <p:spPr>
+          <a:xfrm>
+            <a:off x="4899835" y="1143000"/>
+            <a:ext cx="2567765" cy="215444"/>
+          </a:xfrm>
+          <a:prstGeom prst="rect">
+            <a:avLst/>
+          </a:prstGeom>
+          <a:noFill/>
+        </p:spPr>
+        <p:txBody>
+          <a:bodyPr wrap="square" lIns="0" tIns="0" rIns="0" bIns="0" rtlCol="0">
+            <a:spAutoFit/>
+          </a:bodyPr>
+          <a:lstStyle/>
+          <a:p>
+            <a:r>
+              <a:rPr lang="en-US" sz="1400" dirty="0" err="1" smtClean="0">
+                <a:solidFill>
+                  <a:srgbClr val="7030A0"/>
+                </a:solidFill>
+              </a:rPr>
+              <a:t>checkStateInUndoStack</a:t>
+            </a:r>
+            <a:endParaRPr lang="en-US" sz="1400" dirty="0">
+              <a:solidFill>
+                <a:srgbClr val="7030A0"/>
+              </a:solidFill>
+            </a:endParaRPr>
+          </a:p>
+        </p:txBody>
+      </p:sp>
+      <p:cxnSp>
+        <p:nvCxnSpPr>
+          <p:cNvPr id="41" name="Straight Arrow Connector 40"/>
+          <p:cNvCxnSpPr/>
+          <p:nvPr/>
+        </p:nvCxnSpPr>
+        <p:spPr>
+          <a:xfrm>
+            <a:off x="4572000" y="2286000"/>
+            <a:ext cx="2619598" cy="1398"/>
+          </a:xfrm>
+          <a:prstGeom prst="straightConnector1">
+            <a:avLst/>
+          </a:prstGeom>
+          <a:ln w="19050">
+            <a:solidFill>
+              <a:srgbClr val="7030A0"/>
+            </a:solidFill>
+            <a:prstDash val="sysDash"/>
+            <a:headEnd type="arrow" w="med" len="med"/>
+            <a:tailEnd type="none" w="med" len="med"/>
+          </a:ln>
+        </p:spPr>
+        <p:style>
+          <a:lnRef idx="1">
+            <a:schemeClr val="accent1"/>
+          </a:lnRef>
+          <a:fillRef idx="0">
+            <a:schemeClr val="accent1"/>
+          </a:fillRef>
+          <a:effectRef idx="0">
+            <a:schemeClr val="accent1"/>
+          </a:effectRef>
+          <a:fontRef idx="minor">
+            <a:schemeClr val="tx1"/>
+          </a:fontRef>
+        </p:style>
+      </p:cxnSp>
+    </p:spTree>
+    <p:extLst>
+      <p:ext uri="{BB962C8B-B14F-4D97-AF65-F5344CB8AC3E}">
+        <p14:creationId xmlns:p14="http://schemas.microsoft.com/office/powerpoint/2010/main" val="667122811"/>
       </p:ext>
     </p:extLst>
   </p:cSld>

</xml_diff>

<commit_message>
Created manual testing for submission
</commit_message>
<xml_diff>
--- a/docs/diagrams/Diagrams(CS2103T - V0.3).pptx
+++ b/docs/diagrams/Diagrams(CS2103T - V0.3).pptx
@@ -217,7 +217,7 @@
           <a:p>
             <a:fld id="{F5CC4B3F-88C1-4FFA-B1B6-F41C21DC6924}" type="datetimeFigureOut">
               <a:rPr lang="en-US" smtClean="0"/>
-              <a:t>11/6/16</a:t>
+              <a:t>11/7/16</a:t>
             </a:fld>
             <a:endParaRPr lang="en-US"/>
           </a:p>
@@ -666,7 +666,7 @@
           <a:p>
             <a:fld id="{78C97017-6FC3-485B-9764-EAC9E56C1D49}" type="datetimeFigureOut">
               <a:rPr lang="en-US" smtClean="0"/>
-              <a:t>11/6/16</a:t>
+              <a:t>11/7/16</a:t>
             </a:fld>
             <a:endParaRPr lang="en-US"/>
           </a:p>
@@ -836,7 +836,7 @@
           <a:p>
             <a:fld id="{78C97017-6FC3-485B-9764-EAC9E56C1D49}" type="datetimeFigureOut">
               <a:rPr lang="en-US" smtClean="0"/>
-              <a:t>11/6/16</a:t>
+              <a:t>11/7/16</a:t>
             </a:fld>
             <a:endParaRPr lang="en-US"/>
           </a:p>
@@ -1016,7 +1016,7 @@
           <a:p>
             <a:fld id="{78C97017-6FC3-485B-9764-EAC9E56C1D49}" type="datetimeFigureOut">
               <a:rPr lang="en-US" smtClean="0"/>
-              <a:t>11/6/16</a:t>
+              <a:t>11/7/16</a:t>
             </a:fld>
             <a:endParaRPr lang="en-US"/>
           </a:p>
@@ -1186,7 +1186,7 @@
           <a:p>
             <a:fld id="{78C97017-6FC3-485B-9764-EAC9E56C1D49}" type="datetimeFigureOut">
               <a:rPr lang="en-US" smtClean="0"/>
-              <a:t>11/6/16</a:t>
+              <a:t>11/7/16</a:t>
             </a:fld>
             <a:endParaRPr lang="en-US"/>
           </a:p>
@@ -1432,7 +1432,7 @@
           <a:p>
             <a:fld id="{78C97017-6FC3-485B-9764-EAC9E56C1D49}" type="datetimeFigureOut">
               <a:rPr lang="en-US" smtClean="0"/>
-              <a:t>11/6/16</a:t>
+              <a:t>11/7/16</a:t>
             </a:fld>
             <a:endParaRPr lang="en-US"/>
           </a:p>
@@ -1720,7 +1720,7 @@
           <a:p>
             <a:fld id="{78C97017-6FC3-485B-9764-EAC9E56C1D49}" type="datetimeFigureOut">
               <a:rPr lang="en-US" smtClean="0"/>
-              <a:t>11/6/16</a:t>
+              <a:t>11/7/16</a:t>
             </a:fld>
             <a:endParaRPr lang="en-US"/>
           </a:p>
@@ -2142,7 +2142,7 @@
           <a:p>
             <a:fld id="{78C97017-6FC3-485B-9764-EAC9E56C1D49}" type="datetimeFigureOut">
               <a:rPr lang="en-US" smtClean="0"/>
-              <a:t>11/6/16</a:t>
+              <a:t>11/7/16</a:t>
             </a:fld>
             <a:endParaRPr lang="en-US"/>
           </a:p>
@@ -2260,7 +2260,7 @@
           <a:p>
             <a:fld id="{78C97017-6FC3-485B-9764-EAC9E56C1D49}" type="datetimeFigureOut">
               <a:rPr lang="en-US" smtClean="0"/>
-              <a:t>11/6/16</a:t>
+              <a:t>11/7/16</a:t>
             </a:fld>
             <a:endParaRPr lang="en-US"/>
           </a:p>
@@ -2355,7 +2355,7 @@
           <a:p>
             <a:fld id="{78C97017-6FC3-485B-9764-EAC9E56C1D49}" type="datetimeFigureOut">
               <a:rPr lang="en-US" smtClean="0"/>
-              <a:t>11/6/16</a:t>
+              <a:t>11/7/16</a:t>
             </a:fld>
             <a:endParaRPr lang="en-US"/>
           </a:p>
@@ -2632,7 +2632,7 @@
           <a:p>
             <a:fld id="{78C97017-6FC3-485B-9764-EAC9E56C1D49}" type="datetimeFigureOut">
               <a:rPr lang="en-US" smtClean="0"/>
-              <a:t>11/6/16</a:t>
+              <a:t>11/7/16</a:t>
             </a:fld>
             <a:endParaRPr lang="en-US"/>
           </a:p>
@@ -2885,7 +2885,7 @@
           <a:p>
             <a:fld id="{78C97017-6FC3-485B-9764-EAC9E56C1D49}" type="datetimeFigureOut">
               <a:rPr lang="en-US" smtClean="0"/>
-              <a:t>11/6/16</a:t>
+              <a:t>11/7/16</a:t>
             </a:fld>
             <a:endParaRPr lang="en-US"/>
           </a:p>
@@ -3098,7 +3098,7 @@
           <a:p>
             <a:fld id="{78C97017-6FC3-485B-9764-EAC9E56C1D49}" type="datetimeFigureOut">
               <a:rPr lang="en-US" smtClean="0"/>
-              <a:t>11/6/16</a:t>
+              <a:t>11/7/16</a:t>
             </a:fld>
             <a:endParaRPr lang="en-US"/>
           </a:p>
@@ -4068,7 +4068,7 @@
         </p:nvSpPr>
         <p:spPr>
           <a:xfrm>
-            <a:off x="6983565" y="607926"/>
+            <a:off x="7239000" y="579075"/>
             <a:ext cx="1093635" cy="346760"/>
           </a:xfrm>
           <a:prstGeom prst="rect">
@@ -4127,7 +4127,7 @@
         </p:nvCxnSpPr>
         <p:spPr>
           <a:xfrm>
-            <a:off x="7530382" y="971597"/>
+            <a:off x="7785817" y="942746"/>
             <a:ext cx="0" cy="1723059"/>
           </a:xfrm>
           <a:prstGeom prst="line">
@@ -4164,7 +4164,7 @@
         </p:nvSpPr>
         <p:spPr>
           <a:xfrm>
-            <a:off x="7458374" y="1538408"/>
+            <a:off x="7713809" y="1509557"/>
             <a:ext cx="142006" cy="651394"/>
           </a:xfrm>
           <a:prstGeom prst="rect">
@@ -4337,15 +4337,7 @@
                   <a:srgbClr val="0070C0"/>
                 </a:solidFill>
               </a:rPr>
-              <a:t>execute</a:t>
-            </a:r>
-            <a:r>
-              <a:rPr lang="en-US" sz="1400" dirty="0" smtClean="0">
-                <a:solidFill>
-                  <a:srgbClr val="0070C0"/>
-                </a:solidFill>
-              </a:rPr>
-              <a:t>(“undo”)</a:t>
+              <a:t>execute(“undo”)</a:t>
             </a:r>
             <a:endParaRPr lang="en-US" sz="1400" dirty="0">
               <a:solidFill>
@@ -4399,8 +4391,8 @@
         </p:nvSpPr>
         <p:spPr>
           <a:xfrm>
-            <a:off x="4642221" y="1828800"/>
-            <a:ext cx="2567765" cy="215444"/>
+            <a:off x="4642220" y="1847870"/>
+            <a:ext cx="2999581" cy="215443"/>
           </a:xfrm>
           <a:prstGeom prst="rect">
             <a:avLst/>

</xml_diff>